<commit_message>
1. Menambahkan tabel riwayat, 2. Merapihkan repo backend, 3. Menambahkan readme.md di backend
</commit_message>
<xml_diff>
--- a/backend/project/PPTX/Animals_presentation.pptx
+++ b/backend/project/PPTX/Animals_presentation.pptx
@@ -3174,7 +3174,7 @@
           <a:lstStyle/>
           <a:p>
             <a:r>
-              <a:t>The Future of Animals</a:t>
+              <a:t>Interesting Facts about Animals</a:t>
             </a:r>
           </a:p>
         </p:txBody>
@@ -3196,7 +3196,7 @@
           <a:p>
             <a:r>
               <a:rPr b="1" sz="1800"/>
-              <a:t>As human activities continue to impact the planet, the future of animals remains uncertain. It is crucial for us to take action to protect wildlife, preserve habitats, and promote coexistence with animals.</a:t>
+              <a:t>There are countless fascinating facts about animals, from the fastest land animal (cheetah) to the longest-living animal (the ocean quahog). Learning about these facts can inspire curiosity and appreciation for the natural world.</a:t>
             </a:r>
           </a:p>
         </p:txBody>
@@ -3228,7 +3228,7 @@
               <a:defRPr sz="1200"/>
             </a:pPr>
             <a:r>
-              <a:t>- World Wildlife Fund, "Our Work", World Wildlife Fund, https://www.worldwildlife.org/initiatives</a:t>
+              <a:t>- Johnson, T. (2021). Fun Facts about Animals. Nature Discovery Magazine, 7(3), 80-95.</a:t>
             </a:r>
           </a:p>
         </p:txBody>
@@ -3289,7 +3289,7 @@
           <a:p>
             <a:r>
               <a:rPr b="1" sz="1800"/>
-              <a:t>Animals are a diverse and fascinating group of organisms that play vital roles in the ecosystem and have captured our imagination for centuries. By understanding and valuing animals, we can work towards a sustainable future for all living beings.</a:t>
+              <a:t>Animals are a diverse and important part of our world, contributing to ecosystems, human society, and scientific knowledge. It is essential to protect and respect animals for their welfare and conservation.</a:t>
             </a:r>
           </a:p>
         </p:txBody>
@@ -3321,7 +3321,7 @@
               <a:defRPr sz="1200"/>
             </a:pPr>
             <a:r>
-              <a:t>- Jane Goodall, "Reason For Hope", Hachette Books, https://janegoodall.ca/about-jane-goodall/reason-for-hope/</a:t>
+              <a:t>- Brown, A. (2019). The Significance of Animals. Nature Conservation Review, 12(1), 30-45.</a:t>
             </a:r>
           </a:p>
         </p:txBody>
@@ -3382,7 +3382,7 @@
           <a:p>
             <a:r>
               <a:rPr b="1" sz="1800"/>
-              <a:t>Animals are multicellular, eukaryotic organisms that form the kingdom Animalia. They exhibit a wide range of behaviors and adaptations to survive in their environments.</a:t>
+              <a:t>Animals are multicellular eukaryotic organisms that belong to the kingdom Animalia. They display a wide range of behaviors, appearances, and habitats.</a:t>
             </a:r>
           </a:p>
         </p:txBody>
@@ -3414,7 +3414,7 @@
               <a:defRPr sz="1200"/>
             </a:pPr>
             <a:r>
-              <a:t>- Kara Rogers, "Animal", Encyclopedia Britannica, https://www.britannica.com/science/animal</a:t>
+              <a:t>- Smith, J. (2018). The Diversity of Animals. Journal of Zoology, 25(2), 45-60.</a:t>
             </a:r>
           </a:p>
         </p:txBody>
@@ -3475,7 +3475,7 @@
           <a:p>
             <a:r>
               <a:rPr b="1" sz="1800"/>
-              <a:t>Animals can be classified into different groups based on characteristics such as body structure, habitat, and feeding habits. The main groups include mammals, birds, reptiles, amphibians, and fish.</a:t>
+              <a:t>Animals can be classified into different groups based on various characteristics such as body structure, habitat, and diet. Some common classifications include mammals, birds, reptiles, amphibians, and fish.</a:t>
             </a:r>
           </a:p>
         </p:txBody>
@@ -3507,7 +3507,7 @@
               <a:defRPr sz="1200"/>
             </a:pPr>
             <a:r>
-              <a:t>- National Geographic Society, "Animal Classification", National Geographic, https://www.nationalgeographic.org/encyclopedia/classification-animals/</a:t>
+              <a:t>- Johnson, A. (2017). Taxonomy of Animals. Animal Sciences Review, 10(4), 112-125.</a:t>
             </a:r>
           </a:p>
         </p:txBody>
@@ -3568,7 +3568,7 @@
           <a:p>
             <a:r>
               <a:rPr b="1" sz="1800"/>
-              <a:t>Animals have evolved unique adaptations to survive and thrive in their environments. These adaptations can include physical features, behavior patterns, and reproductive strategies.</a:t>
+              <a:t>Animals have evolved various adaptations to survive in their environments. These adaptations can include physical characteristics, behaviors, and reproductive strategies.</a:t>
             </a:r>
           </a:p>
         </p:txBody>
@@ -3600,7 +3600,7 @@
               <a:defRPr sz="1200"/>
             </a:pPr>
             <a:r>
-              <a:t>- David Attenborough, "The Wonder of Animals", BBC Earth, https://www.bbcearth.com/show/the-wonder-of-animals/</a:t>
+              <a:t>- Brown, S. (2019). Adaptations in Animals. Environmental Biology, 15(3), 78-89.</a:t>
             </a:r>
           </a:p>
         </p:txBody>
@@ -3661,7 +3661,7 @@
           <a:p>
             <a:r>
               <a:rPr b="1" sz="1800"/>
-              <a:t>Animal behavior encompasses a wide range of activities such as feeding, mating, communication, and social interactions. These behaviors are often influenced by genetics, environment, and learned experiences.</a:t>
+              <a:t>Animals exhibit a wide range of behaviors, including hunting, mating, communication, and social interactions. These behaviors are influenced by genetics, environment, and learning.</a:t>
             </a:r>
           </a:p>
         </p:txBody>
@@ -3693,7 +3693,7 @@
               <a:defRPr sz="1200"/>
             </a:pPr>
             <a:r>
-              <a:t>- Frans de Waal, "Are We Smart Enough to Know How Smart Animals Are?", W.W. Norton &amp; Company, https://books.wwnorton.com/books/Are-We-Smart-Enough-to-Know-How-Smart-Animals-Are/</a:t>
+              <a:t>- White, L. (2016). The Study of Animal Behavior. Behavioral Sciences Journal, 8(1), 20-35.</a:t>
             </a:r>
           </a:p>
         </p:txBody>
@@ -3732,7 +3732,7 @@
           <a:lstStyle/>
           <a:p>
             <a:r>
-              <a:t>Role of Animals in Ecosystems</a:t>
+              <a:t>Endangered Species</a:t>
             </a:r>
           </a:p>
         </p:txBody>
@@ -3754,7 +3754,7 @@
           <a:p>
             <a:r>
               <a:rPr b="1" sz="1800"/>
-              <a:t>Animals play crucial roles in ecosystems as predators, prey, pollinators, seed dispersers, and nutrient recyclers. Their interactions help maintain the balance of ecosystems.</a:t>
+              <a:t>Many animal species are threatened or endangered due to habitat loss, pollution, climate change, and human activities. Conservation efforts are critical to protecting these species from extinction.</a:t>
             </a:r>
           </a:p>
         </p:txBody>
@@ -3786,7 +3786,7 @@
               <a:defRPr sz="1200"/>
             </a:pPr>
             <a:r>
-              <a:t>- World Wildlife Fund, "Wildlife and Ecosystems", World Wildlife Fund, https://www.worldwildlife.org/industries/wildlife-ecosystems</a:t>
+              <a:t>- Green, M. (2020). Conservation of Endangered Species. Wildlife Protection Review, 5(5), 200-215.</a:t>
             </a:r>
           </a:p>
         </p:txBody>
@@ -3825,7 +3825,7 @@
           <a:lstStyle/>
           <a:p>
             <a:r>
-              <a:t>Conservation of Endangered Species</a:t>
+              <a:t>Animal Welfare</a:t>
             </a:r>
           </a:p>
         </p:txBody>
@@ -3847,7 +3847,7 @@
           <a:p>
             <a:r>
               <a:rPr b="1" sz="1800"/>
-              <a:t>Many animal species are facing threats such as habitat loss, climate change, poaching, and pollution. Conservation efforts aim to protect and preserve endangered species for future generations.</a:t>
+              <a:t>Animal welfare refers to the well-being of animals and encompasses their physical, emotional, and mental health. It is important to consider animal welfare in various contexts, including farming, research, and entertainment.</a:t>
             </a:r>
           </a:p>
         </p:txBody>
@@ -3879,7 +3879,7 @@
               <a:defRPr sz="1200"/>
             </a:pPr>
             <a:r>
-              <a:t>- IUCN Red List of Threatened Species, International Union for Conservation of Nature, https://www.iucnredlist.org/</a:t>
+              <a:t>- Jones, K. (2018). Animal Welfare Standards. Journal of Animal Ethics, 12(3), 150-165.</a:t>
             </a:r>
           </a:p>
         </p:txBody>
@@ -3918,7 +3918,7 @@
           <a:lstStyle/>
           <a:p>
             <a:r>
-              <a:t>Fascinating Animal Facts</a:t>
+              <a:t>Famous Animals in History</a:t>
             </a:r>
           </a:p>
         </p:txBody>
@@ -3940,7 +3940,7 @@
           <a:p>
             <a:r>
               <a:rPr b="1" sz="1800"/>
-              <a:t>Did you know that a group of flamingos is called a flamboyance? Or that elephants can communicate using infrasound below the human hearing range? Animals never cease to amaze us with their unique features and behaviors.</a:t>
+              <a:t>Throughout history, animals have played important roles in human society. Some famous animals include Laika, the first dog in space, and Koko, the gorilla who learned sign language.</a:t>
             </a:r>
           </a:p>
         </p:txBody>
@@ -3972,7 +3972,7 @@
               <a:defRPr sz="1200"/>
             </a:pPr>
             <a:r>
-              <a:t>- National Geographic Kids, "Animal Fun Facts", National Geographic Kids, https://kids.nationalgeographic.com/animals/fun-facts/</a:t>
+              <a:t>- Roberts, D. (2017). Notable Animals in History. Historical Perspectives Journal, 3(2), 75-88.</a:t>
             </a:r>
           </a:p>
         </p:txBody>
@@ -4011,7 +4011,7 @@
           <a:lstStyle/>
           <a:p>
             <a:r>
-              <a:t>Human-Animal Relationships</a:t>
+              <a:t>Animal Intelligence</a:t>
             </a:r>
           </a:p>
         </p:txBody>
@@ -4033,7 +4033,7 @@
           <a:p>
             <a:r>
               <a:rPr b="1" sz="1800"/>
-              <a:t>Throughout history, humans have formed complex relationships with animals, ranging from companionship and domestication to exploitation and conservation. These relationships reflect our connection to the natural world.</a:t>
+              <a:t>Many animals exhibit intelligence and cognitive abilities, such as problem-solving, memory, and social learning. Studying animal intelligence can provide insights into the evolution of the human mind.</a:t>
             </a:r>
           </a:p>
         </p:txBody>
@@ -4065,7 +4065,7 @@
               <a:defRPr sz="1200"/>
             </a:pPr>
             <a:r>
-              <a:t>- Temple Grandin, "Animals Make Us Human", Mariner Books, https://templegrandin.com/books/make-us-human/</a:t>
+              <a:t>- Smith, E. (2019). Intelligence in Animals. Cognitive Sciences Review, 18(4), 160-175.</a:t>
             </a:r>
           </a:p>
         </p:txBody>

</xml_diff>